<commit_message>
Print to console using different ways to create an output
</commit_message>
<xml_diff>
--- a/DEV204.1x Introduction to C# (edX)/Introduction to C# (edX)(DEV204.1x).pptx
+++ b/DEV204.1x Introduction to C# (edX)/Introduction to C# (edX)(DEV204.1x).pptx
@@ -112,6 +112,11 @@
       </a:defRPr>
     </a:lvl9pPr>
   </p:defaultTextStyle>
+  <p:extLst>
+    <p:ext uri="{EFAFB233-063F-42B5-8137-9DF3F51BA10A}">
+      <p15:sldGuideLst xmlns:p15="http://schemas.microsoft.com/office/powerpoint/2012/main"/>
+    </p:ext>
+  </p:extLst>
 </p:presentation>
 </file>
 
@@ -4427,7 +4432,7 @@
           <a:p>
             <a:fld id="{66EC4F6F-6F96-4FE7-9DB1-0CDEFDC4EE3E}" type="datetimeFigureOut">
               <a:rPr lang="en-CA" smtClean="0"/>
-              <a:t>05/28/2019</a:t>
+              <a:t>05/30/2019</a:t>
             </a:fld>
             <a:endParaRPr lang="en-CA"/>
           </a:p>
@@ -4627,7 +4632,7 @@
           <a:p>
             <a:fld id="{66EC4F6F-6F96-4FE7-9DB1-0CDEFDC4EE3E}" type="datetimeFigureOut">
               <a:rPr lang="en-CA" smtClean="0"/>
-              <a:t>05/28/2019</a:t>
+              <a:t>05/30/2019</a:t>
             </a:fld>
             <a:endParaRPr lang="en-CA"/>
           </a:p>
@@ -4837,7 +4842,7 @@
           <a:p>
             <a:fld id="{66EC4F6F-6F96-4FE7-9DB1-0CDEFDC4EE3E}" type="datetimeFigureOut">
               <a:rPr lang="en-CA" smtClean="0"/>
-              <a:t>05/28/2019</a:t>
+              <a:t>05/30/2019</a:t>
             </a:fld>
             <a:endParaRPr lang="en-CA"/>
           </a:p>
@@ -5037,7 +5042,7 @@
           <a:p>
             <a:fld id="{66EC4F6F-6F96-4FE7-9DB1-0CDEFDC4EE3E}" type="datetimeFigureOut">
               <a:rPr lang="en-CA" smtClean="0"/>
-              <a:t>05/28/2019</a:t>
+              <a:t>05/30/2019</a:t>
             </a:fld>
             <a:endParaRPr lang="en-CA"/>
           </a:p>
@@ -5313,7 +5318,7 @@
           <a:p>
             <a:fld id="{66EC4F6F-6F96-4FE7-9DB1-0CDEFDC4EE3E}" type="datetimeFigureOut">
               <a:rPr lang="en-CA" smtClean="0"/>
-              <a:t>05/28/2019</a:t>
+              <a:t>05/30/2019</a:t>
             </a:fld>
             <a:endParaRPr lang="en-CA"/>
           </a:p>
@@ -5581,7 +5586,7 @@
           <a:p>
             <a:fld id="{66EC4F6F-6F96-4FE7-9DB1-0CDEFDC4EE3E}" type="datetimeFigureOut">
               <a:rPr lang="en-CA" smtClean="0"/>
-              <a:t>05/28/2019</a:t>
+              <a:t>05/30/2019</a:t>
             </a:fld>
             <a:endParaRPr lang="en-CA"/>
           </a:p>
@@ -5996,7 +6001,7 @@
           <a:p>
             <a:fld id="{66EC4F6F-6F96-4FE7-9DB1-0CDEFDC4EE3E}" type="datetimeFigureOut">
               <a:rPr lang="en-CA" smtClean="0"/>
-              <a:t>05/28/2019</a:t>
+              <a:t>05/30/2019</a:t>
             </a:fld>
             <a:endParaRPr lang="en-CA"/>
           </a:p>
@@ -6138,7 +6143,7 @@
           <a:p>
             <a:fld id="{66EC4F6F-6F96-4FE7-9DB1-0CDEFDC4EE3E}" type="datetimeFigureOut">
               <a:rPr lang="en-CA" smtClean="0"/>
-              <a:t>05/28/2019</a:t>
+              <a:t>05/30/2019</a:t>
             </a:fld>
             <a:endParaRPr lang="en-CA"/>
           </a:p>
@@ -6251,7 +6256,7 @@
           <a:p>
             <a:fld id="{66EC4F6F-6F96-4FE7-9DB1-0CDEFDC4EE3E}" type="datetimeFigureOut">
               <a:rPr lang="en-CA" smtClean="0"/>
-              <a:t>05/28/2019</a:t>
+              <a:t>05/30/2019</a:t>
             </a:fld>
             <a:endParaRPr lang="en-CA"/>
           </a:p>
@@ -6564,7 +6569,7 @@
           <a:p>
             <a:fld id="{66EC4F6F-6F96-4FE7-9DB1-0CDEFDC4EE3E}" type="datetimeFigureOut">
               <a:rPr lang="en-CA" smtClean="0"/>
-              <a:t>05/28/2019</a:t>
+              <a:t>05/30/2019</a:t>
             </a:fld>
             <a:endParaRPr lang="en-CA"/>
           </a:p>
@@ -6853,7 +6858,7 @@
           <a:p>
             <a:fld id="{66EC4F6F-6F96-4FE7-9DB1-0CDEFDC4EE3E}" type="datetimeFigureOut">
               <a:rPr lang="en-CA" smtClean="0"/>
-              <a:t>05/28/2019</a:t>
+              <a:t>05/30/2019</a:t>
             </a:fld>
             <a:endParaRPr lang="en-CA"/>
           </a:p>
@@ -7096,7 +7101,7 @@
           <a:p>
             <a:fld id="{66EC4F6F-6F96-4FE7-9DB1-0CDEFDC4EE3E}" type="datetimeFigureOut">
               <a:rPr lang="en-CA" smtClean="0"/>
-              <a:t>05/28/2019</a:t>
+              <a:t>05/30/2019</a:t>
             </a:fld>
             <a:endParaRPr lang="en-CA"/>
           </a:p>
@@ -7529,7 +7534,12 @@
             <p:ph type="ctrTitle"/>
           </p:nvPr>
         </p:nvSpPr>
-        <p:spPr/>
+        <p:spPr>
+          <a:xfrm>
+            <a:off x="1524000" y="395357"/>
+            <a:ext cx="9144000" cy="2387600"/>
+          </a:xfrm>
+        </p:spPr>
         <p:txBody>
           <a:bodyPr/>
           <a:lstStyle/>
@@ -7557,15 +7567,73 @@
             <p:ph type="subTitle" idx="1"/>
           </p:nvPr>
         </p:nvSpPr>
-        <p:spPr/>
+        <p:spPr>
+          <a:xfrm>
+            <a:off x="1524000" y="3079198"/>
+            <a:ext cx="9144000" cy="890381"/>
+          </a:xfrm>
+        </p:spPr>
         <p:txBody>
           <a:bodyPr/>
           <a:lstStyle/>
           <a:p>
-            <a:endParaRPr lang="en-CA"/>
+            <a:r>
+              <a:rPr lang="en-US" dirty="0">
+                <a:hlinkClick r:id="rId2"/>
+              </a:rPr>
+              <a:t>https://www.edx.org/course/introduction-to-c</a:t>
+            </a:r>
+            <a:endParaRPr lang="en-US" dirty="0"/>
           </a:p>
         </p:txBody>
       </p:sp>
+      <p:pic>
+        <p:nvPicPr>
+          <p:cNvPr id="5" name="Picture 2" descr="Courses • Programs &amp; Degrees • Schools &amp; Partners &#10;Home &gt; All Subjects &gt; Computer Science &gt; Introduction to C# &#10;Introduction to C# &#10;About &#10;Search: &#10;Learn the basics of the C# programming language, one of &#10;the most popular programming languages used to develop &#10;software for the Microsoft platform but also used to &#10;develop software for Linux, Android, and iOS systems as &#10;well. &#10;Microsoft ">
+            <a:extLst>
+              <a:ext uri="{FF2B5EF4-FFF2-40B4-BE49-F238E27FC236}">
+                <a16:creationId xmlns:a16="http://schemas.microsoft.com/office/drawing/2014/main" id="{1A2A2F7A-5B7D-450D-B492-D19B65482673}"/>
+              </a:ext>
+            </a:extLst>
+          </p:cNvPr>
+          <p:cNvPicPr>
+            <a:picLocks noChangeAspect="1" noChangeArrowheads="1"/>
+          </p:cNvPicPr>
+          <p:nvPr/>
+        </p:nvPicPr>
+        <p:blipFill>
+          <a:blip r:embed="rId3">
+            <a:extLst>
+              <a:ext uri="{28A0092B-C50C-407E-A947-70E740481C1C}">
+                <a14:useLocalDpi xmlns:a14="http://schemas.microsoft.com/office/drawing/2010/main" val="0"/>
+              </a:ext>
+            </a:extLst>
+          </a:blip>
+          <a:srcRect/>
+          <a:stretch>
+            <a:fillRect/>
+          </a:stretch>
+        </p:blipFill>
+        <p:spPr bwMode="auto">
+          <a:xfrm>
+            <a:off x="3180936" y="3790675"/>
+            <a:ext cx="5830128" cy="2588008"/>
+          </a:xfrm>
+          <a:prstGeom prst="rect">
+            <a:avLst/>
+          </a:prstGeom>
+          <a:noFill/>
+          <a:extLst>
+            <a:ext uri="{909E8E84-426E-40DD-AFC4-6F175D3DCCD1}">
+              <a14:hiddenFill xmlns:a14="http://schemas.microsoft.com/office/drawing/2010/main">
+                <a:solidFill>
+                  <a:srgbClr val="FFFFFF"/>
+                </a:solidFill>
+              </a14:hiddenFill>
+            </a:ext>
+          </a:extLst>
+        </p:spPr>
+      </p:pic>
     </p:spTree>
     <p:extLst>
       <p:ext uri="{BB962C8B-B14F-4D97-AF65-F5344CB8AC3E}">
@@ -7753,7 +7821,7 @@
             <p:ph idx="1"/>
             <p:extLst>
               <p:ext uri="{D42A27DB-BD31-4B8C-83A1-F6EECF244321}">
-                <p14:modId xmlns:p14="http://schemas.microsoft.com/office/powerpoint/2010/main" val="128992552"/>
+                <p14:modId xmlns:p14="http://schemas.microsoft.com/office/powerpoint/2010/main" val="968901755"/>
               </p:ext>
             </p:extLst>
           </p:nvPr>
@@ -7816,7 +7884,7 @@
                       </a:pPr>
                       <a:r>
                         <a:rPr lang="en-CA" dirty="0"/>
-                        <a:t>module 2: Decision Statements</a:t>
+                        <a:t>Module 2: Decision Statements</a:t>
                       </a:r>
                     </a:p>
                   </a:txBody>
@@ -8284,7 +8352,12 @@
             <p:ph type="title"/>
           </p:nvPr>
         </p:nvSpPr>
-        <p:spPr/>
+        <p:spPr>
+          <a:xfrm>
+            <a:off x="838200" y="365125"/>
+            <a:ext cx="10515600" cy="1325563"/>
+          </a:xfrm>
+        </p:spPr>
         <p:txBody>
           <a:bodyPr/>
           <a:lstStyle/>
@@ -8555,7 +8628,7 @@
             </a:r>
             <a:r>
               <a:rPr lang="en-CA" b="1" dirty="0" err="1"/>
-              <a:t>ManoDevelop</a:t>
+              <a:t>MonoDevelop</a:t>
             </a:r>
             <a:endParaRPr lang="en-CA" b="1" dirty="0"/>
           </a:p>
@@ -8589,6 +8662,9 @@
           </a:bodyPr>
           <a:lstStyle/>
           <a:p>
+            <a:pPr marL="0" indent="0">
+              <a:buNone/>
+            </a:pPr>
             <a:r>
               <a:rPr lang="en-CA" dirty="0" err="1"/>
               <a:t>MonoDevelop</a:t>
@@ -8599,6 +8675,15 @@
             </a:r>
           </a:p>
           <a:p>
+            <a:pPr marL="0" indent="0">
+              <a:buNone/>
+            </a:pPr>
+            <a:endParaRPr lang="en-CA" dirty="0"/>
+          </a:p>
+          <a:p>
+            <a:pPr marL="0" indent="0">
+              <a:buNone/>
+            </a:pPr>
             <a:r>
               <a:rPr lang="en-CA" dirty="0" err="1"/>
               <a:t>MonoDevelop</a:t>

</xml_diff>